<commit_message>
Add Platform Architecture slide to PowerPoint deck
- Created detailed Slide 11 showing 3-sided marketplace
- Components: User App, Merchant Hub, Admin Panel
- Intelligence Layer section with data moat capabilities
- Layout: 3-column grid with features for each component
- File size: 241KB → 251KB (still email-friendly)

This brings PowerPoint deck closer to parity with the enhanced web version
by showcasing platform sophistication beyond just the user-facing app.

Co-Authored-By: Claude Sonnet 4.5 <noreply@anthropic.com>
</commit_message>
<xml_diff>
--- a/Nuqta-Pitch-Deck-2026.pptx
+++ b/Nuqta-Pitch-Deck-2026.pptx
@@ -3733,15 +3733,15 @@
         </p:nvSpPr>
         <p:spPr>
           <a:xfrm>
-            <a:off x="1371600" y="771525"/>
+            <a:off x="1371600" y="411480"/>
             <a:ext cx="6400800" cy="257175"/>
           </a:xfrm>
           <a:prstGeom prst="rect">
             <a:avLst/>
           </a:prstGeom>
           <a:solidFill>
-            <a:srgbClr val="C9A227">
-              <a:alpha val="30000"/>
+            <a:srgbClr val="3B82F6">
+              <a:alpha val="15000"/>
             </a:srgbClr>
           </a:solidFill>
           <a:ln/>
@@ -3754,12 +3754,84 @@
               <a:buNone/>
             </a:pPr>
             <a:r>
-              <a:rPr lang="en-US" sz="1200" b="1" dirty="0">
+              <a:rPr lang="en-US" sz="1000" b="1" dirty="0">
+                <a:solidFill>
+                  <a:srgbClr val="3B82F6"/>
+                </a:solidFill>
+              </a:rPr>
+              <a:t>PLATFORM ARCHITECTURE</a:t>
+            </a:r>
+            <a:endParaRPr lang="en-US" sz="1000" dirty="0"/>
+          </a:p>
+        </p:txBody>
+      </p:sp>
+      <p:sp>
+        <p:nvSpPr>
+          <p:cNvPr id="3" name="Text 1"/>
+          <p:cNvSpPr/>
+          <p:nvPr/>
+        </p:nvSpPr>
+        <p:spPr>
+          <a:xfrm>
+            <a:off x="914400" y="720090"/>
+            <a:ext cx="7315200" cy="411480"/>
+          </a:xfrm>
+          <a:prstGeom prst="rect">
+            <a:avLst/>
+          </a:prstGeom>
+          <a:noFill/>
+          <a:ln/>
+        </p:spPr>
+        <p:txBody>
+          <a:bodyPr wrap="square" rtlCol="0" anchor="ctr"/>
+          <a:lstStyle/>
+          <a:p>
+            <a:pPr algn="ctr" indent="0" marL="0">
+              <a:buNone/>
+            </a:pPr>
+            <a:r>
+              <a:rPr lang="en-US" sz="3600" b="1" dirty="0">
                 <a:solidFill>
                   <a:srgbClr val="0A1628"/>
                 </a:solidFill>
               </a:rPr>
-              <a:t>UNIT ECONOMICS</a:t>
+              <a:t>3-Sided Marketplace</a:t>
+            </a:r>
+            <a:endParaRPr lang="en-US" sz="3600" dirty="0"/>
+          </a:p>
+        </p:txBody>
+      </p:sp>
+      <p:sp>
+        <p:nvSpPr>
+          <p:cNvPr id="4" name="Text 2"/>
+          <p:cNvSpPr/>
+          <p:nvPr/>
+        </p:nvSpPr>
+        <p:spPr>
+          <a:xfrm>
+            <a:off x="1371600" y="1183005"/>
+            <a:ext cx="6400800" cy="257175"/>
+          </a:xfrm>
+          <a:prstGeom prst="rect">
+            <a:avLst/>
+          </a:prstGeom>
+          <a:noFill/>
+          <a:ln/>
+        </p:spPr>
+        <p:txBody>
+          <a:bodyPr wrap="square" rtlCol="0" anchor="ctr"/>
+          <a:lstStyle/>
+          <a:p>
+            <a:pPr algn="ctr" indent="0" marL="0">
+              <a:buNone/>
+            </a:pPr>
+            <a:r>
+              <a:rPr lang="en-US" sz="1200" dirty="0">
+                <a:solidFill>
+                  <a:srgbClr val="475569"/>
+                </a:solidFill>
+              </a:rPr>
+              <a:t>Enterprise-grade platform connecting users, merchants, and payment partners</a:t>
             </a:r>
             <a:endParaRPr lang="en-US" sz="1200" dirty="0"/>
           </a:p>
@@ -3767,73 +3839,555 @@
       </p:sp>
       <p:sp>
         <p:nvSpPr>
-          <p:cNvPr id="3" name="Text 1"/>
-          <p:cNvSpPr/>
-          <p:nvPr/>
-        </p:nvSpPr>
-        <p:spPr>
-          <a:xfrm>
-            <a:off x="914400" y="1131570"/>
-            <a:ext cx="7315200" cy="617220"/>
-          </a:xfrm>
-          <a:prstGeom prst="rect">
-            <a:avLst/>
-          </a:prstGeom>
-          <a:noFill/>
-          <a:ln/>
-        </p:spPr>
-        <p:txBody>
-          <a:bodyPr wrap="square" rtlCol="0" anchor="ctr"/>
-          <a:lstStyle/>
-          <a:p>
-            <a:pPr algn="ctr" indent="0" marL="0">
-              <a:buNone/>
-            </a:pPr>
-            <a:r>
-              <a:rPr lang="en-US" sz="4400" b="1" dirty="0">
+          <p:cNvPr id="5" name="Shape 3"/>
+          <p:cNvSpPr/>
+          <p:nvPr/>
+        </p:nvSpPr>
+        <p:spPr>
+          <a:xfrm>
+            <a:off x="731520" y="1645920"/>
+            <a:ext cx="2560320" cy="1440180"/>
+          </a:xfrm>
+          <a:prstGeom prst="rect">
+            <a:avLst/>
+          </a:prstGeom>
+          <a:solidFill>
+            <a:srgbClr val="FFFFFF"/>
+          </a:solidFill>
+          <a:ln w="25400">
+            <a:solidFill>
+              <a:srgbClr val="3B82F6"/>
+            </a:solidFill>
+            <a:prstDash val="solid"/>
+          </a:ln>
+        </p:spPr>
+      </p:sp>
+      <p:sp>
+        <p:nvSpPr>
+          <p:cNvPr id="6" name="Text 4"/>
+          <p:cNvSpPr/>
+          <p:nvPr/>
+        </p:nvSpPr>
+        <p:spPr>
+          <a:xfrm>
+            <a:off x="731520" y="1748790"/>
+            <a:ext cx="2560320" cy="257175"/>
+          </a:xfrm>
+          <a:prstGeom prst="rect">
+            <a:avLst/>
+          </a:prstGeom>
+          <a:noFill/>
+          <a:ln/>
+        </p:spPr>
+        <p:txBody>
+          <a:bodyPr wrap="square" rtlCol="0" anchor="ctr"/>
+          <a:lstStyle/>
+          <a:p>
+            <a:pPr algn="ctr" indent="0" marL="0">
+              <a:buNone/>
+            </a:pPr>
+            <a:r>
+              <a:rPr lang="en-US" sz="1400" b="1" dirty="0">
                 <a:solidFill>
                   <a:srgbClr val="0A1628"/>
                 </a:solidFill>
               </a:rPr>
-              <a:t>18x LTV:CAC Ratio</a:t>
-            </a:r>
-            <a:endParaRPr lang="en-US" sz="4400" dirty="0"/>
-          </a:p>
-        </p:txBody>
-      </p:sp>
-      <p:sp>
-        <p:nvSpPr>
-          <p:cNvPr id="4" name="Text 2"/>
-          <p:cNvSpPr/>
-          <p:nvPr/>
-        </p:nvSpPr>
-        <p:spPr>
-          <a:xfrm>
-            <a:off x="1371600" y="1800225"/>
-            <a:ext cx="6400800" cy="308610"/>
-          </a:xfrm>
-          <a:prstGeom prst="rect">
-            <a:avLst/>
-          </a:prstGeom>
-          <a:noFill/>
-          <a:ln/>
-        </p:spPr>
-        <p:txBody>
-          <a:bodyPr wrap="square" rtlCol="0" anchor="ctr"/>
-          <a:lstStyle/>
-          <a:p>
-            <a:pPr algn="ctr" indent="0" marL="0">
-              <a:buNone/>
-            </a:pPr>
-            <a:r>
-              <a:rPr lang="en-US" sz="1600" dirty="0">
-                <a:solidFill>
-                  <a:srgbClr val="475569"/>
-                </a:solidFill>
-              </a:rPr>
-              <a:t>Industry-leading metrics</a:t>
-            </a:r>
-            <a:endParaRPr lang="en-US" sz="1600" dirty="0"/>
+              <a:t>User App</a:t>
+            </a:r>
+            <a:endParaRPr lang="en-US" sz="1400" dirty="0"/>
+          </a:p>
+        </p:txBody>
+      </p:sp>
+      <p:sp>
+        <p:nvSpPr>
+          <p:cNvPr id="7" name="Text 5"/>
+          <p:cNvSpPr/>
+          <p:nvPr/>
+        </p:nvSpPr>
+        <p:spPr>
+          <a:xfrm>
+            <a:off x="731520" y="2057400"/>
+            <a:ext cx="2468880" cy="925830"/>
+          </a:xfrm>
+          <a:prstGeom prst="rect">
+            <a:avLst/>
+          </a:prstGeom>
+          <a:noFill/>
+          <a:ln/>
+        </p:spPr>
+        <p:txBody>
+          <a:bodyPr wrap="square" rtlCol="0" anchor="t"/>
+          <a:lstStyle/>
+          <a:p>
+            <a:pPr indent="0" marL="0">
+              <a:buNone/>
+            </a:pPr>
+            <a:r>
+              <a:rPr lang="en-US" sz="800" dirty="0">
+                <a:solidFill>
+                  <a:srgbClr val="334155"/>
+                </a:solidFill>
+              </a:rPr>
+              <a:t>• Search Engine: AI, voice, filters</a:t>
+            </a:r>
+            <a:endParaRPr lang="en-US" sz="800" dirty="0"/>
+          </a:p>
+          <a:p>
+            <a:pPr indent="0" marL="0">
+              <a:buNone/>
+            </a:pPr>
+            <a:r>
+              <a:rPr lang="en-US" sz="800" dirty="0">
+                <a:solidFill>
+                  <a:srgbClr val="334155"/>
+                </a:solidFill>
+              </a:rPr>
+              <a:t>• Wallet System: Dual coins</a:t>
+            </a:r>
+            <a:endParaRPr lang="en-US" sz="800" dirty="0"/>
+          </a:p>
+          <a:p>
+            <a:pPr indent="0" marL="0">
+              <a:buNone/>
+            </a:pPr>
+            <a:r>
+              <a:rPr lang="en-US" sz="800" dirty="0">
+                <a:solidFill>
+                  <a:srgbClr val="334155"/>
+                </a:solidFill>
+              </a:rPr>
+              <a:t>• Social: Referrals, leaderboards</a:t>
+            </a:r>
+            <a:endParaRPr lang="en-US" sz="800" dirty="0"/>
+          </a:p>
+          <a:p>
+            <a:pPr indent="0" marL="0">
+              <a:buNone/>
+            </a:pPr>
+            <a:r>
+              <a:rPr lang="en-US" sz="800" dirty="0">
+                <a:solidFill>
+                  <a:srgbClr val="334155"/>
+                </a:solidFill>
+              </a:rPr>
+              <a:t>• Gamification: Loyalty tiers</a:t>
+            </a:r>
+            <a:endParaRPr lang="en-US" sz="800" dirty="0"/>
+          </a:p>
+        </p:txBody>
+      </p:sp>
+      <p:sp>
+        <p:nvSpPr>
+          <p:cNvPr id="8" name="Shape 6"/>
+          <p:cNvSpPr/>
+          <p:nvPr/>
+        </p:nvSpPr>
+        <p:spPr>
+          <a:xfrm>
+            <a:off x="3474720" y="1645920"/>
+            <a:ext cx="2560320" cy="1440180"/>
+          </a:xfrm>
+          <a:prstGeom prst="rect">
+            <a:avLst/>
+          </a:prstGeom>
+          <a:solidFill>
+            <a:srgbClr val="FFFFFF"/>
+          </a:solidFill>
+          <a:ln w="25400">
+            <a:solidFill>
+              <a:srgbClr val="A855F7"/>
+            </a:solidFill>
+            <a:prstDash val="solid"/>
+          </a:ln>
+        </p:spPr>
+      </p:sp>
+      <p:sp>
+        <p:nvSpPr>
+          <p:cNvPr id="9" name="Text 7"/>
+          <p:cNvSpPr/>
+          <p:nvPr/>
+        </p:nvSpPr>
+        <p:spPr>
+          <a:xfrm>
+            <a:off x="3474720" y="1748790"/>
+            <a:ext cx="2560320" cy="257175"/>
+          </a:xfrm>
+          <a:prstGeom prst="rect">
+            <a:avLst/>
+          </a:prstGeom>
+          <a:noFill/>
+          <a:ln/>
+        </p:spPr>
+        <p:txBody>
+          <a:bodyPr wrap="square" rtlCol="0" anchor="ctr"/>
+          <a:lstStyle/>
+          <a:p>
+            <a:pPr algn="ctr" indent="0" marL="0">
+              <a:buNone/>
+            </a:pPr>
+            <a:r>
+              <a:rPr lang="en-US" sz="1400" b="1" dirty="0">
+                <a:solidFill>
+                  <a:srgbClr val="0A1628"/>
+                </a:solidFill>
+              </a:rPr>
+              <a:t>Merchant Hub</a:t>
+            </a:r>
+            <a:endParaRPr lang="en-US" sz="1400" dirty="0"/>
+          </a:p>
+        </p:txBody>
+      </p:sp>
+      <p:sp>
+        <p:nvSpPr>
+          <p:cNvPr id="10" name="Text 8"/>
+          <p:cNvSpPr/>
+          <p:nvPr/>
+        </p:nvSpPr>
+        <p:spPr>
+          <a:xfrm>
+            <a:off x="3474720" y="2057400"/>
+            <a:ext cx="2468880" cy="925830"/>
+          </a:xfrm>
+          <a:prstGeom prst="rect">
+            <a:avLst/>
+          </a:prstGeom>
+          <a:noFill/>
+          <a:ln/>
+        </p:spPr>
+        <p:txBody>
+          <a:bodyPr wrap="square" rtlCol="0" anchor="t"/>
+          <a:lstStyle/>
+          <a:p>
+            <a:pPr indent="0" marL="0">
+              <a:buNone/>
+            </a:pPr>
+            <a:r>
+              <a:rPr lang="en-US" sz="800" dirty="0">
+                <a:solidFill>
+                  <a:srgbClr val="334155"/>
+                </a:solidFill>
+              </a:rPr>
+              <a:t>• Analytics: Demographics, hours</a:t>
+            </a:r>
+            <a:endParaRPr lang="en-US" sz="800" dirty="0"/>
+          </a:p>
+          <a:p>
+            <a:pPr indent="0" marL="0">
+              <a:buNone/>
+            </a:pPr>
+            <a:r>
+              <a:rPr lang="en-US" sz="800" dirty="0">
+                <a:solidFill>
+                  <a:srgbClr val="334155"/>
+                </a:solidFill>
+              </a:rPr>
+              <a:t>• Campaign Manager: A/B testing</a:t>
+            </a:r>
+            <a:endParaRPr lang="en-US" sz="800" dirty="0"/>
+          </a:p>
+          <a:p>
+            <a:pPr indent="0" marL="0">
+              <a:buNone/>
+            </a:pPr>
+            <a:r>
+              <a:rPr lang="en-US" sz="800" dirty="0">
+                <a:solidFill>
+                  <a:srgbClr val="334155"/>
+                </a:solidFill>
+              </a:rPr>
+              <a:t>• QR/POS Integration</a:t>
+            </a:r>
+            <a:endParaRPr lang="en-US" sz="800" dirty="0"/>
+          </a:p>
+          <a:p>
+            <a:pPr indent="0" marL="0">
+              <a:buNone/>
+            </a:pPr>
+            <a:r>
+              <a:rPr lang="en-US" sz="800" dirty="0">
+                <a:solidFill>
+                  <a:srgbClr val="334155"/>
+                </a:solidFill>
+              </a:rPr>
+              <a:t>• Multi-Location Management</a:t>
+            </a:r>
+            <a:endParaRPr lang="en-US" sz="800" dirty="0"/>
+          </a:p>
+        </p:txBody>
+      </p:sp>
+      <p:sp>
+        <p:nvSpPr>
+          <p:cNvPr id="11" name="Shape 9"/>
+          <p:cNvSpPr/>
+          <p:nvPr/>
+        </p:nvSpPr>
+        <p:spPr>
+          <a:xfrm>
+            <a:off x="6217920" y="1645920"/>
+            <a:ext cx="2560320" cy="1440180"/>
+          </a:xfrm>
+          <a:prstGeom prst="rect">
+            <a:avLst/>
+          </a:prstGeom>
+          <a:solidFill>
+            <a:srgbClr val="FFFFFF"/>
+          </a:solidFill>
+          <a:ln w="25400">
+            <a:solidFill>
+              <a:srgbClr val="10B981"/>
+            </a:solidFill>
+            <a:prstDash val="solid"/>
+          </a:ln>
+        </p:spPr>
+      </p:sp>
+      <p:sp>
+        <p:nvSpPr>
+          <p:cNvPr id="12" name="Text 10"/>
+          <p:cNvSpPr/>
+          <p:nvPr/>
+        </p:nvSpPr>
+        <p:spPr>
+          <a:xfrm>
+            <a:off x="6217920" y="1748790"/>
+            <a:ext cx="2560320" cy="257175"/>
+          </a:xfrm>
+          <a:prstGeom prst="rect">
+            <a:avLst/>
+          </a:prstGeom>
+          <a:noFill/>
+          <a:ln/>
+        </p:spPr>
+        <p:txBody>
+          <a:bodyPr wrap="square" rtlCol="0" anchor="ctr"/>
+          <a:lstStyle/>
+          <a:p>
+            <a:pPr algn="ctr" indent="0" marL="0">
+              <a:buNone/>
+            </a:pPr>
+            <a:r>
+              <a:rPr lang="en-US" sz="1400" b="1" dirty="0">
+                <a:solidFill>
+                  <a:srgbClr val="0A1628"/>
+                </a:solidFill>
+              </a:rPr>
+              <a:t>Admin Panel</a:t>
+            </a:r>
+            <a:endParaRPr lang="en-US" sz="1400" dirty="0"/>
+          </a:p>
+        </p:txBody>
+      </p:sp>
+      <p:sp>
+        <p:nvSpPr>
+          <p:cNvPr id="13" name="Text 11"/>
+          <p:cNvSpPr/>
+          <p:nvPr/>
+        </p:nvSpPr>
+        <p:spPr>
+          <a:xfrm>
+            <a:off x="6217920" y="2057400"/>
+            <a:ext cx="2468880" cy="925830"/>
+          </a:xfrm>
+          <a:prstGeom prst="rect">
+            <a:avLst/>
+          </a:prstGeom>
+          <a:noFill/>
+          <a:ln/>
+        </p:spPr>
+        <p:txBody>
+          <a:bodyPr wrap="square" rtlCol="0" anchor="t"/>
+          <a:lstStyle/>
+          <a:p>
+            <a:pPr indent="0" marL="0">
+              <a:buNone/>
+            </a:pPr>
+            <a:r>
+              <a:rPr lang="en-US" sz="800" dirty="0">
+                <a:solidFill>
+                  <a:srgbClr val="334155"/>
+                </a:solidFill>
+              </a:rPr>
+              <a:t>• Fraud Detection: 8-layer defense</a:t>
+            </a:r>
+            <a:endParaRPr lang="en-US" sz="800" dirty="0"/>
+          </a:p>
+          <a:p>
+            <a:pPr indent="0" marL="0">
+              <a:buNone/>
+            </a:pPr>
+            <a:r>
+              <a:rPr lang="en-US" sz="800" dirty="0">
+                <a:solidFill>
+                  <a:srgbClr val="334155"/>
+                </a:solidFill>
+              </a:rPr>
+              <a:t>• KYC Automation</a:t>
+            </a:r>
+            <a:endParaRPr lang="en-US" sz="800" dirty="0"/>
+          </a:p>
+          <a:p>
+            <a:pPr indent="0" marL="0">
+              <a:buNone/>
+            </a:pPr>
+            <a:r>
+              <a:rPr lang="en-US" sz="800" dirty="0">
+                <a:solidFill>
+                  <a:srgbClr val="334155"/>
+                </a:solidFill>
+              </a:rPr>
+              <a:t>• Content Moderation</a:t>
+            </a:r>
+            <a:endParaRPr lang="en-US" sz="800" dirty="0"/>
+          </a:p>
+          <a:p>
+            <a:pPr indent="0" marL="0">
+              <a:buNone/>
+            </a:pPr>
+            <a:r>
+              <a:rPr lang="en-US" sz="800" dirty="0">
+                <a:solidFill>
+                  <a:srgbClr val="334155"/>
+                </a:solidFill>
+              </a:rPr>
+              <a:t>• Financial Reporting</a:t>
+            </a:r>
+            <a:endParaRPr lang="en-US" sz="800" dirty="0"/>
+          </a:p>
+        </p:txBody>
+      </p:sp>
+      <p:sp>
+        <p:nvSpPr>
+          <p:cNvPr id="14" name="Shape 12"/>
+          <p:cNvSpPr/>
+          <p:nvPr/>
+        </p:nvSpPr>
+        <p:spPr>
+          <a:xfrm>
+            <a:off x="731520" y="3240405"/>
+            <a:ext cx="7680960" cy="822960"/>
+          </a:xfrm>
+          <a:prstGeom prst="rect">
+            <a:avLst/>
+          </a:prstGeom>
+          <a:solidFill>
+            <a:srgbClr val="0A1628"/>
+          </a:solidFill>
+          <a:ln w="25400">
+            <a:solidFill>
+              <a:srgbClr val="C9A227"/>
+            </a:solidFill>
+            <a:prstDash val="solid"/>
+          </a:ln>
+        </p:spPr>
+      </p:sp>
+      <p:sp>
+        <p:nvSpPr>
+          <p:cNvPr id="15" name="Text 13"/>
+          <p:cNvSpPr/>
+          <p:nvPr/>
+        </p:nvSpPr>
+        <p:spPr>
+          <a:xfrm>
+            <a:off x="914400" y="3343275"/>
+            <a:ext cx="7315200" cy="205740"/>
+          </a:xfrm>
+          <a:prstGeom prst="rect">
+            <a:avLst/>
+          </a:prstGeom>
+          <a:noFill/>
+          <a:ln/>
+        </p:spPr>
+        <p:txBody>
+          <a:bodyPr wrap="square" rtlCol="0" anchor="ctr"/>
+          <a:lstStyle/>
+          <a:p>
+            <a:pPr indent="0" marL="0">
+              <a:buNone/>
+            </a:pPr>
+            <a:r>
+              <a:rPr lang="en-US" sz="1400" b="1" dirty="0">
+                <a:solidFill>
+                  <a:srgbClr val="C9A227"/>
+                </a:solidFill>
+              </a:rPr>
+              <a:t>Intelligence Layer</a:t>
+            </a:r>
+            <a:endParaRPr lang="en-US" sz="1400" dirty="0"/>
+          </a:p>
+        </p:txBody>
+      </p:sp>
+      <p:sp>
+        <p:nvSpPr>
+          <p:cNvPr id="16" name="Text 14"/>
+          <p:cNvSpPr/>
+          <p:nvPr/>
+        </p:nvSpPr>
+        <p:spPr>
+          <a:xfrm>
+            <a:off x="914400" y="3600450"/>
+            <a:ext cx="7315200" cy="308610"/>
+          </a:xfrm>
+          <a:prstGeom prst="rect">
+            <a:avLst/>
+          </a:prstGeom>
+          <a:noFill/>
+          <a:ln/>
+        </p:spPr>
+        <p:txBody>
+          <a:bodyPr wrap="square" rtlCol="0" anchor="ctr"/>
+          <a:lstStyle/>
+          <a:p>
+            <a:pPr indent="0" marL="0">
+              <a:buNone/>
+            </a:pPr>
+            <a:r>
+              <a:rPr lang="en-US" sz="900" dirty="0">
+                <a:solidFill>
+                  <a:srgbClr val="FFFFFF"/>
+                </a:solidFill>
+              </a:rPr>
+              <a:t>Price Intelligence • Behavioral Insights • Predictive Analytics • Merchant ROI Tracking</a:t>
+            </a:r>
+            <a:endParaRPr lang="en-US" sz="900" dirty="0"/>
+          </a:p>
+        </p:txBody>
+      </p:sp>
+      <p:sp>
+        <p:nvSpPr>
+          <p:cNvPr id="17" name="Text 15"/>
+          <p:cNvSpPr/>
+          <p:nvPr/>
+        </p:nvSpPr>
+        <p:spPr>
+          <a:xfrm>
+            <a:off x="1371600" y="4371975"/>
+            <a:ext cx="6400800" cy="257175"/>
+          </a:xfrm>
+          <a:prstGeom prst="rect">
+            <a:avLst/>
+          </a:prstGeom>
+          <a:solidFill>
+            <a:srgbClr val="3B82F6">
+              <a:alpha val="10000"/>
+            </a:srgbClr>
+          </a:solidFill>
+          <a:ln/>
+        </p:spPr>
+        <p:txBody>
+          <a:bodyPr wrap="square" rtlCol="0" anchor="ctr"/>
+          <a:lstStyle/>
+          <a:p>
+            <a:pPr algn="ctr" indent="0" marL="0">
+              <a:buNone/>
+            </a:pPr>
+            <a:r>
+              <a:rPr lang="en-US" sz="1100" b="1" dirty="0">
+                <a:solidFill>
+                  <a:srgbClr val="3B82F6"/>
+                </a:solidFill>
+              </a:rPr>
+              <a:t>Not just an app • Built as a full-stack platform from Day 1</a:t>
+            </a:r>
+            <a:endParaRPr lang="en-US" sz="1100" dirty="0"/>
           </a:p>
         </p:txBody>
       </p:sp>

</xml_diff>